<commit_message>
Added regex to presentation
</commit_message>
<xml_diff>
--- a/Documentation/presentation/voteMachine.pptx
+++ b/Documentation/presentation/voteMachine.pptx
@@ -7464,6 +7464,13 @@
           <a:p>
             <a:r>
               <a:rPr lang="sv-SE" sz="1500" dirty="0" err="1"/>
+              <a:t>Regex</a:t>
+            </a:r>
+            <a:endParaRPr lang="sv-SE" sz="1500" dirty="0"/>
+          </a:p>
+          <a:p>
+            <a:r>
+              <a:rPr lang="sv-SE" sz="1500" dirty="0" err="1"/>
               <a:t>jQuery</a:t>
             </a:r>
             <a:endParaRPr lang="sv-SE" sz="1500" dirty="0"/>

</xml_diff>